<commit_message>
Cleaned up plot of contrast estimates
</commit_message>
<xml_diff>
--- a/plots/fmri/Figure6.pptx
+++ b/plots/fmri/Figure6.pptx
@@ -260,7 +260,7 @@
           <a:lstStyle/>
           <a:p>
             <a:fld id="{7C067EDE-14C6-B24F-96F0-F6BE30767601}" type="datetimeFigureOut">
-              <a:t>01.04.22</a:t>
+              <a:t>04.04.22</a:t>
             </a:fld>
             <a:endParaRPr lang="en-US"/>
           </a:p>
@@ -458,7 +458,7 @@
           <a:lstStyle/>
           <a:p>
             <a:fld id="{7C067EDE-14C6-B24F-96F0-F6BE30767601}" type="datetimeFigureOut">
-              <a:t>01.04.22</a:t>
+              <a:t>04.04.22</a:t>
             </a:fld>
             <a:endParaRPr lang="en-US"/>
           </a:p>
@@ -666,7 +666,7 @@
           <a:lstStyle/>
           <a:p>
             <a:fld id="{7C067EDE-14C6-B24F-96F0-F6BE30767601}" type="datetimeFigureOut">
-              <a:t>01.04.22</a:t>
+              <a:t>04.04.22</a:t>
             </a:fld>
             <a:endParaRPr lang="en-US"/>
           </a:p>
@@ -864,7 +864,7 @@
           <a:lstStyle/>
           <a:p>
             <a:fld id="{7C067EDE-14C6-B24F-96F0-F6BE30767601}" type="datetimeFigureOut">
-              <a:t>01.04.22</a:t>
+              <a:t>04.04.22</a:t>
             </a:fld>
             <a:endParaRPr lang="en-US"/>
           </a:p>
@@ -1138,7 +1138,7 @@
           <a:lstStyle/>
           <a:p>
             <a:fld id="{7C067EDE-14C6-B24F-96F0-F6BE30767601}" type="datetimeFigureOut">
-              <a:t>01.04.22</a:t>
+              <a:t>04.04.22</a:t>
             </a:fld>
             <a:endParaRPr lang="en-US"/>
           </a:p>
@@ -1404,7 +1404,7 @@
           <a:lstStyle/>
           <a:p>
             <a:fld id="{7C067EDE-14C6-B24F-96F0-F6BE30767601}" type="datetimeFigureOut">
-              <a:t>01.04.22</a:t>
+              <a:t>04.04.22</a:t>
             </a:fld>
             <a:endParaRPr lang="en-US"/>
           </a:p>
@@ -1817,7 +1817,7 @@
           <a:lstStyle/>
           <a:p>
             <a:fld id="{7C067EDE-14C6-B24F-96F0-F6BE30767601}" type="datetimeFigureOut">
-              <a:t>01.04.22</a:t>
+              <a:t>04.04.22</a:t>
             </a:fld>
             <a:endParaRPr lang="en-US"/>
           </a:p>
@@ -1957,7 +1957,7 @@
           <a:lstStyle/>
           <a:p>
             <a:fld id="{7C067EDE-14C6-B24F-96F0-F6BE30767601}" type="datetimeFigureOut">
-              <a:t>01.04.22</a:t>
+              <a:t>04.04.22</a:t>
             </a:fld>
             <a:endParaRPr lang="en-US"/>
           </a:p>
@@ -2068,7 +2068,7 @@
           <a:lstStyle/>
           <a:p>
             <a:fld id="{7C067EDE-14C6-B24F-96F0-F6BE30767601}" type="datetimeFigureOut">
-              <a:t>01.04.22</a:t>
+              <a:t>04.04.22</a:t>
             </a:fld>
             <a:endParaRPr lang="en-US"/>
           </a:p>
@@ -2379,7 +2379,7 @@
           <a:lstStyle/>
           <a:p>
             <a:fld id="{7C067EDE-14C6-B24F-96F0-F6BE30767601}" type="datetimeFigureOut">
-              <a:t>01.04.22</a:t>
+              <a:t>04.04.22</a:t>
             </a:fld>
             <a:endParaRPr lang="en-US"/>
           </a:p>
@@ -2666,7 +2666,7 @@
           <a:lstStyle/>
           <a:p>
             <a:fld id="{7C067EDE-14C6-B24F-96F0-F6BE30767601}" type="datetimeFigureOut">
-              <a:t>01.04.22</a:t>
+              <a:t>04.04.22</a:t>
             </a:fld>
             <a:endParaRPr lang="en-US"/>
           </a:p>
@@ -2907,7 +2907,7 @@
           </a:lstStyle>
           <a:p>
             <a:fld id="{7C067EDE-14C6-B24F-96F0-F6BE30767601}" type="datetimeFigureOut">
-              <a:t>01.04.22</a:t>
+              <a:t>04.04.22</a:t>
             </a:fld>
             <a:endParaRPr lang="en-US"/>
           </a:p>
@@ -3518,7 +3518,7 @@
         <p:spPr>
           <a:xfrm>
             <a:off x="6622" y="3331325"/>
-            <a:ext cx="8177822" cy="631496"/>
+            <a:ext cx="8505200" cy="698808"/>
           </a:xfrm>
           <a:prstGeom prst="rect">
             <a:avLst/>
@@ -3563,8 +3563,8 @@
         </p:nvSpPr>
         <p:spPr>
           <a:xfrm>
-            <a:off x="3065938" y="939950"/>
-            <a:ext cx="5118506" cy="2489050"/>
+            <a:off x="3149951" y="912221"/>
+            <a:ext cx="5361871" cy="2489050"/>
           </a:xfrm>
           <a:prstGeom prst="rect">
             <a:avLst/>
@@ -3597,10 +3597,10 @@
       </p:sp>
       <p:pic>
         <p:nvPicPr>
-          <p:cNvPr id="37" name="Grafik 36">
-            <a:extLst>
-              <a:ext uri="{FF2B5EF4-FFF2-40B4-BE49-F238E27FC236}">
-                <a16:creationId xmlns:a16="http://schemas.microsoft.com/office/drawing/2014/main" id="{50EAA32D-22B2-1A4F-9459-DD050897A103}"/>
+          <p:cNvPr id="38" name="Grafik 37" descr="Ein Bild, das Text enthält.&#10;&#10;Automatisch generierte Beschreibung">
+            <a:extLst>
+              <a:ext uri="{FF2B5EF4-FFF2-40B4-BE49-F238E27FC236}">
+                <a16:creationId xmlns:a16="http://schemas.microsoft.com/office/drawing/2014/main" id="{9DFB50B2-6E44-0C46-B967-FF54213DA3D4}"/>
               </a:ext>
             </a:extLst>
           </p:cNvPr>
@@ -3610,55 +3610,14 @@
           <p:nvPr/>
         </p:nvPicPr>
         <p:blipFill>
-          <a:blip r:embed="rId2">
-            <a:clrChange>
-              <a:clrFrom>
-                <a:srgbClr val="FFFFFF"/>
-              </a:clrFrom>
-              <a:clrTo>
-                <a:srgbClr val="FFFFFF">
-                  <a:alpha val="0"/>
-                </a:srgbClr>
-              </a:clrTo>
-            </a:clrChange>
-          </a:blip>
+          <a:blip r:embed="rId2"/>
           <a:stretch>
             <a:fillRect/>
           </a:stretch>
         </p:blipFill>
         <p:spPr>
           <a:xfrm>
-            <a:off x="5790583" y="1257605"/>
-            <a:ext cx="2073720" cy="2073720"/>
-          </a:xfrm>
-          <a:prstGeom prst="rect">
-            <a:avLst/>
-          </a:prstGeom>
-        </p:spPr>
-      </p:pic>
-      <p:pic>
-        <p:nvPicPr>
-          <p:cNvPr id="38" name="Grafik 37" descr="Ein Bild, das Text enthält.&#10;&#10;Automatisch generierte Beschreibung">
-            <a:extLst>
-              <a:ext uri="{FF2B5EF4-FFF2-40B4-BE49-F238E27FC236}">
-                <a16:creationId xmlns:a16="http://schemas.microsoft.com/office/drawing/2014/main" id="{9DFB50B2-6E44-0C46-B967-FF54213DA3D4}"/>
-              </a:ext>
-            </a:extLst>
-          </p:cNvPr>
-          <p:cNvPicPr>
-            <a:picLocks noChangeAspect="1"/>
-          </p:cNvPicPr>
-          <p:nvPr/>
-        </p:nvPicPr>
-        <p:blipFill>
-          <a:blip r:embed="rId3"/>
-          <a:stretch>
-            <a:fillRect/>
-          </a:stretch>
-        </p:blipFill>
-        <p:spPr>
-          <a:xfrm>
-            <a:off x="6622" y="937251"/>
+            <a:off x="0" y="905985"/>
             <a:ext cx="5463820" cy="2513726"/>
           </a:xfrm>
           <a:prstGeom prst="rect">
@@ -3681,7 +3640,7 @@
           <p:nvPr/>
         </p:nvPicPr>
         <p:blipFill rotWithShape="1">
-          <a:blip r:embed="rId4"/>
+          <a:blip r:embed="rId3"/>
           <a:srcRect l="68065" b="95684"/>
           <a:stretch/>
         </p:blipFill>
@@ -3734,7 +3693,7 @@
               </a:spcAft>
             </a:pPr>
             <a:r>
-              <a:rPr lang="de-DE" sz="1400" b="1" kern="100">
+              <a:rPr lang="de-DE" sz="1200" b="1" kern="100">
                 <a:solidFill>
                   <a:srgbClr val="FF0000"/>
                 </a:solidFill>
@@ -3743,7 +3702,7 @@
               </a:rPr>
               <a:t>x = -10</a:t>
             </a:r>
-            <a:endParaRPr lang="de-DE" sz="1400" kern="100">
+            <a:endParaRPr lang="de-DE" sz="1200" kern="100">
               <a:solidFill>
                 <a:srgbClr val="FF0000"/>
               </a:solidFill>
@@ -3792,7 +3751,7 @@
               </a:spcAft>
             </a:pPr>
             <a:r>
-              <a:rPr lang="de-DE" sz="1400" b="1" kern="100">
+              <a:rPr lang="de-DE" sz="1200" b="1" kern="100">
                 <a:solidFill>
                   <a:srgbClr val="FF0000"/>
                 </a:solidFill>
@@ -3801,7 +3760,7 @@
               </a:rPr>
               <a:t>y = 10 </a:t>
             </a:r>
-            <a:endParaRPr lang="de-DE" sz="1400" kern="100">
+            <a:endParaRPr lang="de-DE" sz="1200" kern="100">
               <a:solidFill>
                 <a:srgbClr val="FF0000"/>
               </a:solidFill>
@@ -3825,7 +3784,7 @@
         </p:nvSpPr>
         <p:spPr>
           <a:xfrm>
-            <a:off x="6622" y="3438289"/>
+            <a:off x="-10144" y="3438290"/>
             <a:ext cx="4567194" cy="1049063"/>
           </a:xfrm>
           <a:prstGeom prst="rect">
@@ -3850,18 +3809,48 @@
               </a:spcAft>
             </a:pPr>
             <a:r>
-              <a:rPr lang="de-DE" sz="1400" kern="100">
+              <a:rPr lang="de-DE" sz="1200" kern="100">
                 <a:solidFill>
                   <a:srgbClr val="0070C0"/>
                 </a:solidFill>
                 <a:latin typeface="Arial" panose="020B0604020202020204" pitchFamily="34" charset="0"/>
                 <a:cs typeface="Arial" panose="020B0604020202020204" pitchFamily="34" charset="0"/>
               </a:rPr>
-              <a:t>        3                 6                 9            	</a:t>
-            </a:r>
-          </a:p>
-        </p:txBody>
-      </p:sp>
+              <a:t>        3                       6                       9            	</a:t>
+            </a:r>
+          </a:p>
+        </p:txBody>
+      </p:sp>
+      <p:pic>
+        <p:nvPicPr>
+          <p:cNvPr id="3" name="Grafik 2">
+            <a:extLst>
+              <a:ext uri="{FF2B5EF4-FFF2-40B4-BE49-F238E27FC236}">
+                <a16:creationId xmlns:a16="http://schemas.microsoft.com/office/drawing/2014/main" id="{E1FE8361-6063-1941-8AD6-2F770A4F06B9}"/>
+              </a:ext>
+            </a:extLst>
+          </p:cNvPr>
+          <p:cNvPicPr>
+            <a:picLocks noChangeAspect="1"/>
+          </p:cNvPicPr>
+          <p:nvPr/>
+        </p:nvPicPr>
+        <p:blipFill>
+          <a:blip r:embed="rId4"/>
+          <a:stretch>
+            <a:fillRect/>
+          </a:stretch>
+        </p:blipFill>
+        <p:spPr>
+          <a:xfrm>
+            <a:off x="5527289" y="912221"/>
+            <a:ext cx="2736580" cy="2736580"/>
+          </a:xfrm>
+          <a:prstGeom prst="rect">
+            <a:avLst/>
+          </a:prstGeom>
+        </p:spPr>
+      </p:pic>
     </p:spTree>
     <p:extLst>
       <p:ext uri="{BB962C8B-B14F-4D97-AF65-F5344CB8AC3E}">

</xml_diff>